<commit_message>
Update content for first day
</commit_message>
<xml_diff>
--- a/files/CS373/IntroToCompSciResearch.pptx
+++ b/files/CS373/IntroToCompSciResearch.pptx
@@ -4941,7 +4941,7 @@
         <a:p>
           <a:r>
             <a:rPr lang="en-US" dirty="0"/>
-            <a:t>At the end of the course: Paper, presentation, and dialogue on a topic:</a:t>
+            <a:t>At the end of the course: Paper, presentation, demo, and dialogue on a topic:</a:t>
           </a:r>
         </a:p>
       </dgm:t>
@@ -5546,10 +5546,9 @@
         <a:lstStyle/>
         <a:p>
           <a:r>
-            <a:rPr lang="en-US"/>
+            <a:rPr lang="en-US" dirty="0"/>
             <a:t>Collaborative approach to life</a:t>
           </a:r>
-          <a:endParaRPr lang="en-US" dirty="0"/>
         </a:p>
       </dgm:t>
     </dgm:pt>
@@ -5721,6 +5720,78 @@
         </a:p>
       </dgm:t>
     </dgm:pt>
+    <dgm:pt modelId="{3EE4EE86-4C2B-454B-8891-7F7499D25AA7}">
+      <dgm:prSet/>
+      <dgm:spPr/>
+      <dgm:t>
+        <a:bodyPr/>
+        <a:lstStyle/>
+        <a:p>
+          <a:r>
+            <a:rPr lang="en-US" b="1" dirty="0"/>
+            <a:t>I am ready for change</a:t>
+          </a:r>
+        </a:p>
+      </dgm:t>
+    </dgm:pt>
+    <dgm:pt modelId="{E4AE1CEF-FB26-E740-8C03-2ACB44939919}" type="parTrans" cxnId="{C780C6E7-7ED6-3F4C-9C71-E9E769BF52C9}">
+      <dgm:prSet/>
+      <dgm:spPr/>
+      <dgm:t>
+        <a:bodyPr/>
+        <a:lstStyle/>
+        <a:p>
+          <a:endParaRPr lang="en-US"/>
+        </a:p>
+      </dgm:t>
+    </dgm:pt>
+    <dgm:pt modelId="{4A706F21-62F1-5F4D-8603-963696369E71}" type="sibTrans" cxnId="{C780C6E7-7ED6-3F4C-9C71-E9E769BF52C9}">
+      <dgm:prSet/>
+      <dgm:spPr/>
+      <dgm:t>
+        <a:bodyPr/>
+        <a:lstStyle/>
+        <a:p>
+          <a:endParaRPr lang="en-US"/>
+        </a:p>
+      </dgm:t>
+    </dgm:pt>
+    <dgm:pt modelId="{84C182A7-7422-1D44-AAC5-3195EFF32541}">
+      <dgm:prSet/>
+      <dgm:spPr/>
+      <dgm:t>
+        <a:bodyPr/>
+        <a:lstStyle/>
+        <a:p>
+          <a:r>
+            <a:rPr lang="en-US" b="1" dirty="0"/>
+            <a:t>I am a learner</a:t>
+          </a:r>
+        </a:p>
+      </dgm:t>
+    </dgm:pt>
+    <dgm:pt modelId="{46AE0018-984F-2241-AF36-1C201564BA8E}" type="parTrans" cxnId="{5BDA0AA5-CE73-1C40-8745-5009CF97658D}">
+      <dgm:prSet/>
+      <dgm:spPr/>
+      <dgm:t>
+        <a:bodyPr/>
+        <a:lstStyle/>
+        <a:p>
+          <a:endParaRPr lang="en-US"/>
+        </a:p>
+      </dgm:t>
+    </dgm:pt>
+    <dgm:pt modelId="{BC98A5CC-C74C-9946-92C4-ED71F7820F67}" type="sibTrans" cxnId="{5BDA0AA5-CE73-1C40-8745-5009CF97658D}">
+      <dgm:prSet/>
+      <dgm:spPr/>
+      <dgm:t>
+        <a:bodyPr/>
+        <a:lstStyle/>
+        <a:p>
+          <a:endParaRPr lang="en-US"/>
+        </a:p>
+      </dgm:t>
+    </dgm:pt>
     <dgm:pt modelId="{1F7DAA39-6288-BD43-AFCE-28919DBE02E5}" type="pres">
       <dgm:prSet presAssocID="{89CC62C4-A29C-4577-BE36-0D950318FE5C}" presName="linear" presStyleCnt="0">
         <dgm:presLayoutVars>
@@ -5800,18 +5871,22 @@
     <dgm:cxn modelId="{1813C049-76B4-5540-918B-C9F65000BDB6}" srcId="{C3229F2C-9501-FF4C-BA0B-CE00868C6670}" destId="{F03311D3-9E96-BF47-A0EC-1E34EB2A41C1}" srcOrd="2" destOrd="0" parTransId="{FEB3BC20-C130-564B-BA8C-2F5AD0E98678}" sibTransId="{32076314-4E2B-9C40-838B-AA7054D1EDC0}"/>
     <dgm:cxn modelId="{D7362D4B-6ECE-8E4D-B9DF-923CB990E982}" srcId="{C3229F2C-9501-FF4C-BA0B-CE00868C6670}" destId="{04BB5AB3-8BC2-FD46-9566-FCBD026410C9}" srcOrd="1" destOrd="0" parTransId="{9AE37466-C301-D84E-B698-4CB0B6EAC3B3}" sibTransId="{BF56CC74-4E9D-9444-AC64-E366920AC4E1}"/>
     <dgm:cxn modelId="{936CB75D-3527-A546-9150-93FC836304B9}" type="presOf" srcId="{F03311D3-9E96-BF47-A0EC-1E34EB2A41C1}" destId="{98C4EB67-A9EF-4A43-9E6E-AA99A22738E2}" srcOrd="0" destOrd="2" presId="urn:microsoft.com/office/officeart/2005/8/layout/list1"/>
+    <dgm:cxn modelId="{26B4197A-169D-0D4B-AE40-C697EA0E7436}" type="presOf" srcId="{84C182A7-7422-1D44-AAC5-3195EFF32541}" destId="{98C4EB67-A9EF-4A43-9E6E-AA99A22738E2}" srcOrd="0" destOrd="3" presId="urn:microsoft.com/office/officeart/2005/8/layout/list1"/>
     <dgm:cxn modelId="{8E73B37C-2AC2-714A-AC7F-601D936C5DFC}" type="presOf" srcId="{C3229F2C-9501-FF4C-BA0B-CE00868C6670}" destId="{0156E9E8-1BAF-254D-AE13-BE99CFE6C2F8}" srcOrd="1" destOrd="0" presId="urn:microsoft.com/office/officeart/2005/8/layout/list1"/>
     <dgm:cxn modelId="{36F3FD7D-E423-9548-BB79-889A22415C3E}" type="presOf" srcId="{04BB5AB3-8BC2-FD46-9566-FCBD026410C9}" destId="{98C4EB67-A9EF-4A43-9E6E-AA99A22738E2}" srcOrd="0" destOrd="1" presId="urn:microsoft.com/office/officeart/2005/8/layout/list1"/>
     <dgm:cxn modelId="{5C02B18A-CAE7-654D-8047-D20BBBCEE716}" type="presOf" srcId="{C3229F2C-9501-FF4C-BA0B-CE00868C6670}" destId="{724C464E-881D-A64F-A694-52A45A9D2263}" srcOrd="0" destOrd="0" presId="urn:microsoft.com/office/officeart/2005/8/layout/list1"/>
     <dgm:cxn modelId="{D8191F90-7347-2D46-B3A5-AE83A3406702}" srcId="{C3229F2C-9501-FF4C-BA0B-CE00868C6670}" destId="{551CC894-31F9-464A-89AE-5FE01E9EABBD}" srcOrd="0" destOrd="0" parTransId="{0545DC0C-D2B8-EC44-A4E2-4AA7C2C4B5AA}" sibTransId="{2E7C6BD7-90DE-7E46-BE5B-CA41F28B7D75}"/>
     <dgm:cxn modelId="{4E36FF97-2F1D-7F44-A704-39113F1691D2}" type="presOf" srcId="{551CC894-31F9-464A-89AE-5FE01E9EABBD}" destId="{98C4EB67-A9EF-4A43-9E6E-AA99A22738E2}" srcOrd="0" destOrd="0" presId="urn:microsoft.com/office/officeart/2005/8/layout/list1"/>
     <dgm:cxn modelId="{66DD339B-FF0C-104E-966B-DFC6BE4A4B1F}" type="presOf" srcId="{89CC62C4-A29C-4577-BE36-0D950318FE5C}" destId="{1F7DAA39-6288-BD43-AFCE-28919DBE02E5}" srcOrd="0" destOrd="0" presId="urn:microsoft.com/office/officeart/2005/8/layout/list1"/>
+    <dgm:cxn modelId="{5BDA0AA5-CE73-1C40-8745-5009CF97658D}" srcId="{C3229F2C-9501-FF4C-BA0B-CE00868C6670}" destId="{84C182A7-7422-1D44-AAC5-3195EFF32541}" srcOrd="3" destOrd="0" parTransId="{46AE0018-984F-2241-AF36-1C201564BA8E}" sibTransId="{BC98A5CC-C74C-9946-92C4-ED71F7820F67}"/>
+    <dgm:cxn modelId="{904BABAD-50B0-8449-A4AC-3021CD9A63DF}" type="presOf" srcId="{3EE4EE86-4C2B-454B-8891-7F7499D25AA7}" destId="{5654DCA6-F438-BB4E-B2C8-B35D49E7FE66}" srcOrd="0" destOrd="3" presId="urn:microsoft.com/office/officeart/2005/8/layout/list1"/>
     <dgm:cxn modelId="{3EDE70B7-6F5A-4542-984D-3104DCFEFF48}" type="presOf" srcId="{4255CC74-55A4-45B5-B616-CBEBA9BDE4F5}" destId="{F44617B7-7947-0049-89E7-E57E5C7F4EAB}" srcOrd="0" destOrd="0" presId="urn:microsoft.com/office/officeart/2005/8/layout/list1"/>
     <dgm:cxn modelId="{DE399ABF-7BF9-C745-9F6C-B39320EDE776}" type="presOf" srcId="{41E24F17-FF48-A140-A62D-BA0F8FD1A379}" destId="{5654DCA6-F438-BB4E-B2C8-B35D49E7FE66}" srcOrd="0" destOrd="1" presId="urn:microsoft.com/office/officeart/2005/8/layout/list1"/>
     <dgm:cxn modelId="{2EDB82C4-CB50-2A46-A65F-07E0913A4202}" type="presOf" srcId="{4255CC74-55A4-45B5-B616-CBEBA9BDE4F5}" destId="{D825121D-FA8C-0F4E-A09B-4D7BAC3533AE}" srcOrd="1" destOrd="0" presId="urn:microsoft.com/office/officeart/2005/8/layout/list1"/>
     <dgm:cxn modelId="{8C80DBC7-7694-41E3-8C98-34382952B023}" srcId="{89CC62C4-A29C-4577-BE36-0D950318FE5C}" destId="{4255CC74-55A4-45B5-B616-CBEBA9BDE4F5}" srcOrd="0" destOrd="0" parTransId="{15D54409-02CC-4E94-9CE1-FCCC0F196EE1}" sibTransId="{DFC4127B-CC04-48DC-890B-74E5CCAE2B08}"/>
     <dgm:cxn modelId="{1F9EA5CB-930F-5D44-BBE9-7B8710BC5484}" type="presOf" srcId="{100C5447-98AA-F341-A6C4-D111FBC8BB17}" destId="{5654DCA6-F438-BB4E-B2C8-B35D49E7FE66}" srcOrd="0" destOrd="0" presId="urn:microsoft.com/office/officeart/2005/8/layout/list1"/>
     <dgm:cxn modelId="{A50B76E3-8F32-3A4A-94BD-43B7ABD8EB75}" srcId="{89CC62C4-A29C-4577-BE36-0D950318FE5C}" destId="{C3229F2C-9501-FF4C-BA0B-CE00868C6670}" srcOrd="1" destOrd="0" parTransId="{F380D3F3-71EA-F144-AD9E-684221E9E61B}" sibTransId="{313B935A-3773-F84C-96B8-699EF803BFE7}"/>
+    <dgm:cxn modelId="{C780C6E7-7ED6-3F4C-9C71-E9E769BF52C9}" srcId="{4255CC74-55A4-45B5-B616-CBEBA9BDE4F5}" destId="{3EE4EE86-4C2B-454B-8891-7F7499D25AA7}" srcOrd="3" destOrd="0" parTransId="{E4AE1CEF-FB26-E740-8C03-2ACB44939919}" sibTransId="{4A706F21-62F1-5F4D-8603-963696369E71}"/>
     <dgm:cxn modelId="{94E721EE-F81E-024E-8288-C0084FD51A96}" srcId="{4255CC74-55A4-45B5-B616-CBEBA9BDE4F5}" destId="{41E24F17-FF48-A140-A62D-BA0F8FD1A379}" srcOrd="1" destOrd="0" parTransId="{F33B5FF6-5D60-244F-848E-BFB0749F6902}" sibTransId="{F1E23301-AB3A-184F-BC34-5BB5F67ECC29}"/>
     <dgm:cxn modelId="{EFF5A3F5-1241-0443-95BD-72BC623A7064}" type="presOf" srcId="{FC7C1AA0-9882-634D-BA51-01B9B7397584}" destId="{5654DCA6-F438-BB4E-B2C8-B35D49E7FE66}" srcOrd="0" destOrd="2" presId="urn:microsoft.com/office/officeart/2005/8/layout/list1"/>
     <dgm:cxn modelId="{515C7826-EEA3-8943-A636-7A7CB7A8F66B}" type="presParOf" srcId="{1F7DAA39-6288-BD43-AFCE-28919DBE02E5}" destId="{6080DA3A-C648-A042-8E85-5D129B3C6958}" srcOrd="0" destOrd="0" presId="urn:microsoft.com/office/officeart/2005/8/layout/list1"/>
@@ -8700,7 +8775,7 @@
       </dsp:nvSpPr>
       <dsp:spPr>
         <a:xfrm>
-          <a:off x="0" y="628955"/>
+          <a:off x="0" y="628956"/>
           <a:ext cx="6797675" cy="2142000"/>
         </a:xfrm>
         <a:prstGeom prst="rect">
@@ -8760,7 +8835,7 @@
           </a:pPr>
           <a:r>
             <a:rPr lang="en-US" sz="2000" kern="1200" dirty="0"/>
-            <a:t>At the end of the course: Paper, presentation, and dialogue on a topic:</a:t>
+            <a:t>At the end of the course: Paper, presentation, demo, and dialogue on a topic:</a:t>
           </a:r>
         </a:p>
         <a:p>
@@ -8819,7 +8894,7 @@
         </a:p>
       </dsp:txBody>
       <dsp:txXfrm>
-        <a:off x="0" y="628955"/>
+        <a:off x="0" y="628956"/>
         <a:ext cx="6797675" cy="2142000"/>
       </dsp:txXfrm>
     </dsp:sp>
@@ -8830,8 +8905,8 @@
       </dsp:nvSpPr>
       <dsp:spPr>
         <a:xfrm>
-          <a:off x="339883" y="333755"/>
-          <a:ext cx="4758372" cy="590400"/>
+          <a:off x="339883" y="333756"/>
+          <a:ext cx="4758372" cy="590399"/>
         </a:xfrm>
         <a:prstGeom prst="roundRect">
           <a:avLst/>
@@ -8896,8 +8971,8 @@
         </a:p>
       </dsp:txBody>
       <dsp:txXfrm>
-        <a:off x="368704" y="362576"/>
-        <a:ext cx="4700730" cy="532758"/>
+        <a:off x="368704" y="362577"/>
+        <a:ext cx="4700730" cy="532757"/>
       </dsp:txXfrm>
     </dsp:sp>
     <dsp:sp modelId="{2256F558-DC5A-A045-BF63-24A07A537E9E}">
@@ -9056,7 +9131,7 @@
       <dsp:spPr>
         <a:xfrm>
           <a:off x="339883" y="2878956"/>
-          <a:ext cx="4758372" cy="590400"/>
+          <a:ext cx="4758372" cy="590399"/>
         </a:xfrm>
         <a:prstGeom prst="roundRect">
           <a:avLst/>
@@ -9122,7 +9197,7 @@
       </dsp:txBody>
       <dsp:txXfrm>
         <a:off x="368704" y="2907777"/>
-        <a:ext cx="4700730" cy="532758"/>
+        <a:ext cx="4700730" cy="532757"/>
       </dsp:txXfrm>
     </dsp:sp>
   </dsp:spTree>
@@ -9144,8 +9219,8 @@
       </dsp:nvSpPr>
       <dsp:spPr>
         <a:xfrm>
-          <a:off x="0" y="1217556"/>
-          <a:ext cx="6797675" cy="1436400"/>
+          <a:off x="0" y="888380"/>
+          <a:ext cx="6797675" cy="1735650"/>
         </a:xfrm>
         <a:prstGeom prst="rect">
           <a:avLst/>
@@ -9241,15 +9316,32 @@
             <a:buChar char="•"/>
           </a:pPr>
           <a:r>
-            <a:rPr lang="en-US" sz="1900" kern="1200"/>
+            <a:rPr lang="en-US" sz="1900" kern="1200" dirty="0"/>
             <a:t>Collaborative approach to life</a:t>
           </a:r>
-          <a:endParaRPr lang="en-US" sz="1900" kern="1200" dirty="0"/>
+        </a:p>
+        <a:p>
+          <a:pPr marL="171450" lvl="1" indent="-171450" algn="l" defTabSz="844550">
+            <a:lnSpc>
+              <a:spcPct val="90000"/>
+            </a:lnSpc>
+            <a:spcBef>
+              <a:spcPct val="0"/>
+            </a:spcBef>
+            <a:spcAft>
+              <a:spcPct val="15000"/>
+            </a:spcAft>
+            <a:buChar char="•"/>
+          </a:pPr>
+          <a:r>
+            <a:rPr lang="en-US" sz="1900" b="1" kern="1200" dirty="0"/>
+            <a:t>I am ready for change</a:t>
+          </a:r>
         </a:p>
       </dsp:txBody>
       <dsp:txXfrm>
-        <a:off x="0" y="1217556"/>
-        <a:ext cx="6797675" cy="1436400"/>
+        <a:off x="0" y="888380"/>
+        <a:ext cx="6797675" cy="1735650"/>
       </dsp:txXfrm>
     </dsp:sp>
     <dsp:sp modelId="{D825121D-FA8C-0F4E-A09B-4D7BAC3533AE}">
@@ -9259,8 +9351,8 @@
       </dsp:nvSpPr>
       <dsp:spPr>
         <a:xfrm>
-          <a:off x="339883" y="937116"/>
-          <a:ext cx="4758372" cy="560880"/>
+          <a:off x="339883" y="607940"/>
+          <a:ext cx="4758372" cy="560879"/>
         </a:xfrm>
         <a:prstGeom prst="roundRect">
           <a:avLst/>
@@ -9326,8 +9418,8 @@
         </a:p>
       </dsp:txBody>
       <dsp:txXfrm>
-        <a:off x="367263" y="964496"/>
-        <a:ext cx="4703612" cy="506120"/>
+        <a:off x="367263" y="635320"/>
+        <a:ext cx="4703612" cy="506119"/>
       </dsp:txXfrm>
     </dsp:sp>
     <dsp:sp modelId="{98C4EB67-A9EF-4A43-9E6E-AA99A22738E2}">
@@ -9337,8 +9429,8 @@
       </dsp:nvSpPr>
       <dsp:spPr>
         <a:xfrm>
-          <a:off x="0" y="3036996"/>
-          <a:ext cx="6797675" cy="1675800"/>
+          <a:off x="0" y="3007071"/>
+          <a:ext cx="6797675" cy="2034900"/>
         </a:xfrm>
         <a:prstGeom prst="rect">
           <a:avLst/>
@@ -9438,10 +9530,28 @@
             <a:t>Collaborate today with colleagues &amp; increase your existing network</a:t>
           </a:r>
         </a:p>
+        <a:p>
+          <a:pPr marL="171450" lvl="1" indent="-171450" algn="l" defTabSz="844550">
+            <a:lnSpc>
+              <a:spcPct val="90000"/>
+            </a:lnSpc>
+            <a:spcBef>
+              <a:spcPct val="0"/>
+            </a:spcBef>
+            <a:spcAft>
+              <a:spcPct val="15000"/>
+            </a:spcAft>
+            <a:buChar char="•"/>
+          </a:pPr>
+          <a:r>
+            <a:rPr lang="en-US" sz="1900" b="1" kern="1200" dirty="0"/>
+            <a:t>I am a learner</a:t>
+          </a:r>
+        </a:p>
       </dsp:txBody>
       <dsp:txXfrm>
-        <a:off x="0" y="3036996"/>
-        <a:ext cx="6797675" cy="1675800"/>
+        <a:off x="0" y="3007071"/>
+        <a:ext cx="6797675" cy="2034900"/>
       </dsp:txXfrm>
     </dsp:sp>
     <dsp:sp modelId="{0156E9E8-1BAF-254D-AE13-BE99CFE6C2F8}">
@@ -9451,8 +9561,8 @@
       </dsp:nvSpPr>
       <dsp:spPr>
         <a:xfrm>
-          <a:off x="339883" y="2756556"/>
-          <a:ext cx="4758372" cy="560880"/>
+          <a:off x="339883" y="2726630"/>
+          <a:ext cx="4758372" cy="560879"/>
         </a:xfrm>
         <a:prstGeom prst="roundRect">
           <a:avLst/>
@@ -9517,8 +9627,8 @@
         </a:p>
       </dsp:txBody>
       <dsp:txXfrm>
-        <a:off x="367263" y="2783936"/>
-        <a:ext cx="4703612" cy="506120"/>
+        <a:off x="367263" y="2754010"/>
+        <a:ext cx="4703612" cy="506119"/>
       </dsp:txXfrm>
     </dsp:sp>
   </dsp:spTree>
@@ -22642,7 +22752,7 @@
           <a:p>
             <a:fld id="{9184DA70-C731-4C70-880D-CCD4705E623C}" type="datetime1">
               <a:rPr lang="en-US" smtClean="0"/>
-              <a:t>1/16/23</a:t>
+              <a:t>1/17/24</a:t>
             </a:fld>
             <a:endParaRPr lang="en-US" dirty="0"/>
           </a:p>
@@ -22830,7 +22940,7 @@
           <a:p>
             <a:fld id="{B612A279-0833-481D-8C56-F67FD0AC6C50}" type="datetime1">
               <a:rPr lang="en-US" smtClean="0"/>
-              <a:t>1/16/23</a:t>
+              <a:t>1/17/24</a:t>
             </a:fld>
             <a:endParaRPr lang="en-US" dirty="0"/>
           </a:p>
@@ -23072,7 +23182,7 @@
           <a:p>
             <a:fld id="{6587DA83-5663-4C9C-B9AA-0B40A3DAFF81}" type="datetime1">
               <a:rPr lang="en-US" smtClean="0"/>
-              <a:t>1/16/23</a:t>
+              <a:t>1/17/24</a:t>
             </a:fld>
             <a:endParaRPr lang="en-US" dirty="0"/>
           </a:p>
@@ -23260,7 +23370,7 @@
           <a:p>
             <a:fld id="{4BE1D723-8F53-4F53-90B0-1982A396982E}" type="datetime1">
               <a:rPr lang="en-US" smtClean="0"/>
-              <a:t>1/16/23</a:t>
+              <a:t>1/17/24</a:t>
             </a:fld>
             <a:endParaRPr lang="en-US" dirty="0"/>
           </a:p>
@@ -23633,7 +23743,7 @@
           <a:p>
             <a:fld id="{97669AF7-7BEB-44E4-9852-375E34362B5B}" type="datetime1">
               <a:rPr lang="en-US" smtClean="0"/>
-              <a:t>1/16/23</a:t>
+              <a:t>1/17/24</a:t>
             </a:fld>
             <a:endParaRPr lang="en-US" dirty="0"/>
           </a:p>
@@ -23888,7 +23998,7 @@
           <a:p>
             <a:fld id="{BAAAC38D-0552-4C82-B593-E6124DFADBE2}" type="datetime1">
               <a:rPr lang="en-US" smtClean="0"/>
-              <a:t>1/16/23</a:t>
+              <a:t>1/17/24</a:t>
             </a:fld>
             <a:endParaRPr lang="en-US" dirty="0"/>
           </a:p>
@@ -24285,7 +24395,7 @@
           <a:p>
             <a:fld id="{D9DF0F1C-5577-4ACB-BB62-DF8F3C494C7E}" type="datetime1">
               <a:rPr lang="en-US" smtClean="0"/>
-              <a:t>1/16/23</a:t>
+              <a:t>1/17/24</a:t>
             </a:fld>
             <a:endParaRPr lang="en-US" dirty="0"/>
           </a:p>
@@ -24421,7 +24531,7 @@
           <a:p>
             <a:fld id="{1775B394-D9F9-4F0C-B15D-605F45CB9E9F}" type="datetime1">
               <a:rPr lang="en-US" smtClean="0"/>
-              <a:t>1/16/23</a:t>
+              <a:t>1/17/24</a:t>
             </a:fld>
             <a:endParaRPr lang="en-US" dirty="0"/>
           </a:p>
@@ -24578,7 +24688,7 @@
           <a:p>
             <a:fld id="{39667345-2558-425A-8533-9BFDBCE15005}" type="datetime1">
               <a:rPr lang="en-US" smtClean="0"/>
-              <a:t>1/16/23</a:t>
+              <a:t>1/17/24</a:t>
             </a:fld>
             <a:endParaRPr lang="en-US" dirty="0"/>
           </a:p>
@@ -24907,7 +25017,7 @@
           <a:p>
             <a:fld id="{92BEA474-078D-4E9B-9B14-09A87B19DC46}" type="datetime1">
               <a:rPr lang="en-US" smtClean="0"/>
-              <a:t>1/16/23</a:t>
+              <a:t>1/17/24</a:t>
             </a:fld>
             <a:endParaRPr lang="en-US" dirty="0"/>
           </a:p>
@@ -25257,7 +25367,7 @@
           <a:p>
             <a:fld id="{4907D986-8816-4272-A432-0437A28A9828}" type="datetime1">
               <a:rPr lang="en-US" smtClean="0"/>
-              <a:t>1/16/23</a:t>
+              <a:t>1/17/24</a:t>
             </a:fld>
             <a:endParaRPr lang="en-US" dirty="0"/>
           </a:p>
@@ -25518,7 +25628,7 @@
           <a:p>
             <a:fld id="{62D6E202-B606-4609-B914-27C9371A1F6D}" type="datetime1">
               <a:rPr lang="en-US" smtClean="0"/>
-              <a:t>1/16/23</a:t>
+              <a:t>1/17/24</a:t>
             </a:fld>
             <a:endParaRPr lang="en-US" dirty="0"/>
           </a:p>
@@ -26412,6 +26522,13 @@
             <a:schemeClr val="lt1"/>
           </a:fontRef>
         </p:style>
+        <p:txBody>
+          <a:bodyPr/>
+          <a:lstStyle/>
+          <a:p>
+            <a:endParaRPr lang="en-US"/>
+          </a:p>
+        </p:txBody>
       </p:sp>
       <p:sp>
         <p:nvSpPr>
@@ -26739,6 +26856,13 @@
             <a:schemeClr val="lt1"/>
           </a:fontRef>
         </p:style>
+        <p:txBody>
+          <a:bodyPr/>
+          <a:lstStyle/>
+          <a:p>
+            <a:endParaRPr lang="en-US"/>
+          </a:p>
+        </p:txBody>
       </p:sp>
       <p:sp>
         <p:nvSpPr>
@@ -26795,7 +26919,7 @@
             <p:ph idx="1"/>
             <p:extLst>
               <p:ext uri="{D42A27DB-BD31-4B8C-83A1-F6EECF244321}">
-                <p14:modId xmlns:p14="http://schemas.microsoft.com/office/powerpoint/2010/main" val="2899921034"/>
+                <p14:modId xmlns:p14="http://schemas.microsoft.com/office/powerpoint/2010/main" val="885361537"/>
               </p:ext>
             </p:extLst>
           </p:nvPr>
@@ -26965,6 +27089,13 @@
             <a:schemeClr val="lt1"/>
           </a:fontRef>
         </p:style>
+        <p:txBody>
+          <a:bodyPr/>
+          <a:lstStyle/>
+          <a:p>
+            <a:endParaRPr lang="en-US"/>
+          </a:p>
+        </p:txBody>
       </p:sp>
       <p:sp>
         <p:nvSpPr>
@@ -27021,7 +27152,7 @@
             <p:ph idx="1"/>
             <p:extLst>
               <p:ext uri="{D42A27DB-BD31-4B8C-83A1-F6EECF244321}">
-                <p14:modId xmlns:p14="http://schemas.microsoft.com/office/powerpoint/2010/main" val="4071490655"/>
+                <p14:modId xmlns:p14="http://schemas.microsoft.com/office/powerpoint/2010/main" val="804877635"/>
               </p:ext>
             </p:extLst>
           </p:nvPr>
@@ -27279,6 +27410,13 @@
             <a:schemeClr val="lt1"/>
           </a:fontRef>
         </p:style>
+        <p:txBody>
+          <a:bodyPr/>
+          <a:lstStyle/>
+          <a:p>
+            <a:endParaRPr lang="en-US"/>
+          </a:p>
+        </p:txBody>
       </p:sp>
       <p:graphicFrame>
         <p:nvGraphicFramePr>
@@ -27604,6 +27742,13 @@
             <a:schemeClr val="lt1"/>
           </a:fontRef>
         </p:style>
+        <p:txBody>
+          <a:bodyPr/>
+          <a:lstStyle/>
+          <a:p>
+            <a:endParaRPr lang="en-US"/>
+          </a:p>
+        </p:txBody>
       </p:sp>
       <p:graphicFrame>
         <p:nvGraphicFramePr>
@@ -27898,6 +28043,13 @@
             <a:schemeClr val="lt1"/>
           </a:fontRef>
         </p:style>
+        <p:txBody>
+          <a:bodyPr/>
+          <a:lstStyle/>
+          <a:p>
+            <a:endParaRPr lang="en-US"/>
+          </a:p>
+        </p:txBody>
       </p:sp>
       <p:graphicFrame>
         <p:nvGraphicFramePr>
@@ -28173,6 +28325,13 @@
             <a:schemeClr val="lt1"/>
           </a:fontRef>
         </p:style>
+        <p:txBody>
+          <a:bodyPr/>
+          <a:lstStyle/>
+          <a:p>
+            <a:endParaRPr lang="en-US"/>
+          </a:p>
+        </p:txBody>
       </p:sp>
       <p:graphicFrame>
         <p:nvGraphicFramePr>
@@ -28461,6 +28620,78 @@
               <a:t>We will embrace and explore the use of these tools!</a:t>
             </a:r>
           </a:p>
+          <a:p>
+            <a:r>
+              <a:rPr lang="en-US" dirty="0"/>
+              <a:t>We have a </a:t>
+            </a:r>
+            <a:r>
+              <a:rPr lang="en-US" dirty="0">
+                <a:hlinkClick r:id="rId3"/>
+              </a:rPr>
+              <a:t>virtual CS373 instructor</a:t>
+            </a:r>
+            <a:r>
+              <a:rPr lang="en-US" dirty="0"/>
+              <a:t>*</a:t>
+            </a:r>
+          </a:p>
+        </p:txBody>
+      </p:sp>
+      <p:sp>
+        <p:nvSpPr>
+          <p:cNvPr id="4" name="TextBox 3">
+            <a:extLst>
+              <a:ext uri="{FF2B5EF4-FFF2-40B4-BE49-F238E27FC236}">
+                <a16:creationId xmlns:a16="http://schemas.microsoft.com/office/drawing/2014/main" id="{BC14C4A6-BBA5-8CF6-8F99-7A25CE3BF4A9}"/>
+              </a:ext>
+            </a:extLst>
+          </p:cNvPr>
+          <p:cNvSpPr txBox="1"/>
+          <p:nvPr/>
+        </p:nvSpPr>
+        <p:spPr>
+          <a:xfrm>
+            <a:off x="4823460" y="6252210"/>
+            <a:ext cx="7214154" cy="338554"/>
+          </a:xfrm>
+          <a:prstGeom prst="rect">
+            <a:avLst/>
+          </a:prstGeom>
+        </p:spPr>
+        <p:style>
+          <a:lnRef idx="2">
+            <a:schemeClr val="dk1"/>
+          </a:lnRef>
+          <a:fillRef idx="1">
+            <a:schemeClr val="lt1"/>
+          </a:fillRef>
+          <a:effectRef idx="0">
+            <a:schemeClr val="dk1"/>
+          </a:effectRef>
+          <a:fontRef idx="minor">
+            <a:schemeClr val="dk1"/>
+          </a:fontRef>
+        </p:style>
+        <p:txBody>
+          <a:bodyPr wrap="none" rtlCol="0">
+            <a:spAutoFit/>
+          </a:bodyPr>
+          <a:lstStyle/>
+          <a:p>
+            <a:r>
+              <a:rPr lang="en-US" sz="1600" dirty="0"/>
+              <a:t>* https://</a:t>
+            </a:r>
+            <a:r>
+              <a:rPr lang="en-US" sz="1600" dirty="0" err="1"/>
+              <a:t>chat.openai.com</a:t>
+            </a:r>
+            <a:r>
+              <a:rPr lang="en-US" sz="1600" dirty="0"/>
+              <a:t>/g/g-0m35Mzndc-cs-capstone-course-companion</a:t>
+            </a:r>
+          </a:p>
         </p:txBody>
       </p:sp>
     </p:spTree>
@@ -28708,71 +28939,70 @@
           <a:lstStyle/>
           <a:p>
             <a:r>
-              <a:rPr lang="en-US"/>
+              <a:rPr lang="en-US" dirty="0"/>
               <a:t>Keep strategic goals in mind</a:t>
             </a:r>
           </a:p>
           <a:p>
             <a:pPr lvl="1"/>
             <a:r>
-              <a:rPr lang="en-US"/>
+              <a:rPr lang="en-US" dirty="0"/>
               <a:t>Prepare for professional life</a:t>
             </a:r>
           </a:p>
           <a:p>
             <a:pPr lvl="1"/>
             <a:r>
-              <a:rPr lang="en-US"/>
+              <a:rPr lang="en-US" dirty="0"/>
               <a:t>Cultivate a growth mindset</a:t>
             </a:r>
           </a:p>
           <a:p>
             <a:pPr lvl="1"/>
             <a:r>
-              <a:rPr lang="en-US"/>
+              <a:rPr lang="en-US" dirty="0"/>
               <a:t>Our tactics can change</a:t>
             </a:r>
           </a:p>
           <a:p>
             <a:r>
-              <a:rPr lang="en-US"/>
+              <a:rPr lang="en-US" dirty="0"/>
               <a:t>Be transparent</a:t>
             </a:r>
           </a:p>
           <a:p>
             <a:pPr lvl="1"/>
             <a:r>
-              <a:rPr lang="en-US"/>
-              <a:t>Communicate to me and your team about opportunities, challenges</a:t>
+              <a:rPr lang="en-US" dirty="0"/>
+              <a:t>Communicate to me and your classmates about opportunities, challenges</a:t>
             </a:r>
           </a:p>
           <a:p>
             <a:pPr lvl="1"/>
             <a:r>
-              <a:rPr lang="en-US"/>
+              <a:rPr lang="en-US" dirty="0"/>
               <a:t>Communicate early, when issues are just emerging and easier to address</a:t>
             </a:r>
           </a:p>
           <a:p>
             <a:r>
-              <a:rPr lang="en-US"/>
+              <a:rPr lang="en-US" dirty="0"/>
               <a:t>Commit</a:t>
             </a:r>
           </a:p>
           <a:p>
             <a:pPr lvl="1"/>
             <a:r>
-              <a:rPr lang="en-US"/>
+              <a:rPr lang="en-US" dirty="0"/>
               <a:t>Stay focused</a:t>
             </a:r>
           </a:p>
           <a:p>
             <a:pPr lvl="1"/>
             <a:r>
-              <a:rPr lang="en-US"/>
+              <a:rPr lang="en-US" dirty="0"/>
               <a:t>Adapt as needed</a:t>
             </a:r>
-            <a:endParaRPr lang="en-US" dirty="0"/>
           </a:p>
         </p:txBody>
       </p:sp>
@@ -28832,6 +29062,13 @@
             <a:schemeClr val="lt1"/>
           </a:fontRef>
         </p:style>
+        <p:txBody>
+          <a:bodyPr/>
+          <a:lstStyle/>
+          <a:p>
+            <a:endParaRPr lang="en-US"/>
+          </a:p>
+        </p:txBody>
       </p:sp>
     </p:spTree>
     <p:extLst>

</xml_diff>

<commit_message>
Update for first class
</commit_message>
<xml_diff>
--- a/files/CS373/IntroToCompSciResearch.pptx
+++ b/files/CS373/IntroToCompSciResearch.pptx
@@ -25607,7 +25607,7 @@
           <a:p>
             <a:fld id="{9184DA70-C731-4C70-880D-CCD4705E623C}" type="datetime1">
               <a:rPr lang="en-US" smtClean="0"/>
-              <a:t>8/26/24</a:t>
+              <a:t>1/23/25</a:t>
             </a:fld>
             <a:endParaRPr lang="en-US" dirty="0"/>
           </a:p>
@@ -25795,7 +25795,7 @@
           <a:p>
             <a:fld id="{B612A279-0833-481D-8C56-F67FD0AC6C50}" type="datetime1">
               <a:rPr lang="en-US" smtClean="0"/>
-              <a:t>8/26/24</a:t>
+              <a:t>1/23/25</a:t>
             </a:fld>
             <a:endParaRPr lang="en-US" dirty="0"/>
           </a:p>
@@ -26037,7 +26037,7 @@
           <a:p>
             <a:fld id="{6587DA83-5663-4C9C-B9AA-0B40A3DAFF81}" type="datetime1">
               <a:rPr lang="en-US" smtClean="0"/>
-              <a:t>8/26/24</a:t>
+              <a:t>1/23/25</a:t>
             </a:fld>
             <a:endParaRPr lang="en-US" dirty="0"/>
           </a:p>
@@ -26225,7 +26225,7 @@
           <a:p>
             <a:fld id="{4BE1D723-8F53-4F53-90B0-1982A396982E}" type="datetime1">
               <a:rPr lang="en-US" smtClean="0"/>
-              <a:t>8/26/24</a:t>
+              <a:t>1/23/25</a:t>
             </a:fld>
             <a:endParaRPr lang="en-US" dirty="0"/>
           </a:p>
@@ -26598,7 +26598,7 @@
           <a:p>
             <a:fld id="{97669AF7-7BEB-44E4-9852-375E34362B5B}" type="datetime1">
               <a:rPr lang="en-US" smtClean="0"/>
-              <a:t>8/26/24</a:t>
+              <a:t>1/23/25</a:t>
             </a:fld>
             <a:endParaRPr lang="en-US" dirty="0"/>
           </a:p>
@@ -26853,7 +26853,7 @@
           <a:p>
             <a:fld id="{BAAAC38D-0552-4C82-B593-E6124DFADBE2}" type="datetime1">
               <a:rPr lang="en-US" smtClean="0"/>
-              <a:t>8/26/24</a:t>
+              <a:t>1/23/25</a:t>
             </a:fld>
             <a:endParaRPr lang="en-US" dirty="0"/>
           </a:p>
@@ -27250,7 +27250,7 @@
           <a:p>
             <a:fld id="{D9DF0F1C-5577-4ACB-BB62-DF8F3C494C7E}" type="datetime1">
               <a:rPr lang="en-US" smtClean="0"/>
-              <a:t>8/26/24</a:t>
+              <a:t>1/23/25</a:t>
             </a:fld>
             <a:endParaRPr lang="en-US" dirty="0"/>
           </a:p>
@@ -27386,7 +27386,7 @@
           <a:p>
             <a:fld id="{1775B394-D9F9-4F0C-B15D-605F45CB9E9F}" type="datetime1">
               <a:rPr lang="en-US" smtClean="0"/>
-              <a:t>8/26/24</a:t>
+              <a:t>1/23/25</a:t>
             </a:fld>
             <a:endParaRPr lang="en-US" dirty="0"/>
           </a:p>
@@ -27543,7 +27543,7 @@
           <a:p>
             <a:fld id="{39667345-2558-425A-8533-9BFDBCE15005}" type="datetime1">
               <a:rPr lang="en-US" smtClean="0"/>
-              <a:t>8/26/24</a:t>
+              <a:t>1/23/25</a:t>
             </a:fld>
             <a:endParaRPr lang="en-US" dirty="0"/>
           </a:p>
@@ -27872,7 +27872,7 @@
           <a:p>
             <a:fld id="{92BEA474-078D-4E9B-9B14-09A87B19DC46}" type="datetime1">
               <a:rPr lang="en-US" smtClean="0"/>
-              <a:t>8/26/24</a:t>
+              <a:t>1/23/25</a:t>
             </a:fld>
             <a:endParaRPr lang="en-US" dirty="0"/>
           </a:p>
@@ -28222,7 +28222,7 @@
           <a:p>
             <a:fld id="{4907D986-8816-4272-A432-0437A28A9828}" type="datetime1">
               <a:rPr lang="en-US" smtClean="0"/>
-              <a:t>8/26/24</a:t>
+              <a:t>1/23/25</a:t>
             </a:fld>
             <a:endParaRPr lang="en-US" dirty="0"/>
           </a:p>
@@ -28483,7 +28483,7 @@
           <a:p>
             <a:fld id="{62D6E202-B606-4609-B914-27C9371A1F6D}" type="datetime1">
               <a:rPr lang="en-US" smtClean="0"/>
-              <a:t>8/26/24</a:t>
+              <a:t>1/23/25</a:t>
             </a:fld>
             <a:endParaRPr lang="en-US" dirty="0"/>
           </a:p>
@@ -32269,6 +32269,25 @@
               <a:t>*</a:t>
             </a:r>
           </a:p>
+          <a:p>
+            <a:r>
+              <a:rPr lang="en-US" dirty="0"/>
+              <a:t>We have </a:t>
+            </a:r>
+            <a:r>
+              <a:rPr lang="en-US" dirty="0">
+                <a:hlinkClick r:id="rId4"/>
+              </a:rPr>
+              <a:t>Gemini Deep Research</a:t>
+            </a:r>
+            <a:endParaRPr lang="en-US" dirty="0"/>
+          </a:p>
+          <a:p>
+            <a:r>
+              <a:rPr lang="en-US" dirty="0"/>
+              <a:t>…And many emerging capabilities</a:t>
+            </a:r>
+          </a:p>
         </p:txBody>
       </p:sp>
       <p:sp>

</xml_diff>

<commit_message>
Update Intro to Comp Sci Research slides and PDF
Replaced the PDF and PowerPoint files for the Intro to Computer Science Research course with updated versions.
</commit_message>
<xml_diff>
--- a/files/CS373/IntroToCompSciResearch.pptx
+++ b/files/CS373/IntroToCompSciResearch.pptx
@@ -9405,7 +9405,7 @@
           </a:pPr>
           <a:r>
             <a:rPr lang="en-US" dirty="0"/>
-            <a:t>GitHub</a:t>
+            <a:t>Zotero</a:t>
           </a:r>
         </a:p>
       </dgm:t>
@@ -9453,10 +9453,24 @@
     <dgm:pt modelId="{CC4B5B53-5B04-784F-9F92-0CAAF9127E1C}" type="parTrans" cxnId="{234783D0-3E7B-E245-844E-0A6121B1A0EA}">
       <dgm:prSet/>
       <dgm:spPr/>
+      <dgm:t>
+        <a:bodyPr/>
+        <a:lstStyle/>
+        <a:p>
+          <a:endParaRPr lang="en-US"/>
+        </a:p>
+      </dgm:t>
     </dgm:pt>
     <dgm:pt modelId="{47A14A82-3DC8-154E-84CA-260E4A58B751}" type="sibTrans" cxnId="{234783D0-3E7B-E245-844E-0A6121B1A0EA}">
       <dgm:prSet/>
       <dgm:spPr/>
+      <dgm:t>
+        <a:bodyPr/>
+        <a:lstStyle/>
+        <a:p>
+          <a:endParaRPr lang="en-US"/>
+        </a:p>
+      </dgm:t>
     </dgm:pt>
     <dgm:pt modelId="{FAA7060D-D04B-164F-A52B-9CACDC285B17}" type="pres">
       <dgm:prSet presAssocID="{D5A63248-0152-4C48-B8EB-A61B48FBAA8A}" presName="matrix" presStyleCnt="0">
@@ -14820,7 +14834,7 @@
           </a:pPr>
           <a:r>
             <a:rPr lang="en-US" sz="2000" kern="1200" dirty="0"/>
-            <a:t>GitHub</a:t>
+            <a:t>Zotero</a:t>
           </a:r>
         </a:p>
         <a:p>
@@ -25423,6 +25437,13 @@
             <a:schemeClr val="lt1"/>
           </a:fontRef>
         </p:style>
+        <p:txBody>
+          <a:bodyPr/>
+          <a:lstStyle/>
+          <a:p>
+            <a:endParaRPr lang="en-US"/>
+          </a:p>
+        </p:txBody>
       </p:sp>
       <p:sp>
         <p:nvSpPr>
@@ -25607,7 +25628,7 @@
           <a:p>
             <a:fld id="{9184DA70-C731-4C70-880D-CCD4705E623C}" type="datetime1">
               <a:rPr lang="en-US" smtClean="0"/>
-              <a:t>1/23/25</a:t>
+              <a:t>1/23/26</a:t>
             </a:fld>
             <a:endParaRPr lang="en-US" dirty="0"/>
           </a:p>
@@ -25795,7 +25816,7 @@
           <a:p>
             <a:fld id="{B612A279-0833-481D-8C56-F67FD0AC6C50}" type="datetime1">
               <a:rPr lang="en-US" smtClean="0"/>
-              <a:t>1/23/25</a:t>
+              <a:t>1/23/26</a:t>
             </a:fld>
             <a:endParaRPr lang="en-US" dirty="0"/>
           </a:p>
@@ -26037,7 +26058,7 @@
           <a:p>
             <a:fld id="{6587DA83-5663-4C9C-B9AA-0B40A3DAFF81}" type="datetime1">
               <a:rPr lang="en-US" smtClean="0"/>
-              <a:t>1/23/25</a:t>
+              <a:t>1/23/26</a:t>
             </a:fld>
             <a:endParaRPr lang="en-US" dirty="0"/>
           </a:p>
@@ -26225,7 +26246,7 @@
           <a:p>
             <a:fld id="{4BE1D723-8F53-4F53-90B0-1982A396982E}" type="datetime1">
               <a:rPr lang="en-US" smtClean="0"/>
-              <a:t>1/23/25</a:t>
+              <a:t>1/23/26</a:t>
             </a:fld>
             <a:endParaRPr lang="en-US" dirty="0"/>
           </a:p>
@@ -26598,7 +26619,7 @@
           <a:p>
             <a:fld id="{97669AF7-7BEB-44E4-9852-375E34362B5B}" type="datetime1">
               <a:rPr lang="en-US" smtClean="0"/>
-              <a:t>1/23/25</a:t>
+              <a:t>1/23/26</a:t>
             </a:fld>
             <a:endParaRPr lang="en-US" dirty="0"/>
           </a:p>
@@ -26853,7 +26874,7 @@
           <a:p>
             <a:fld id="{BAAAC38D-0552-4C82-B593-E6124DFADBE2}" type="datetime1">
               <a:rPr lang="en-US" smtClean="0"/>
-              <a:t>1/23/25</a:t>
+              <a:t>1/23/26</a:t>
             </a:fld>
             <a:endParaRPr lang="en-US" dirty="0"/>
           </a:p>
@@ -27250,7 +27271,7 @@
           <a:p>
             <a:fld id="{D9DF0F1C-5577-4ACB-BB62-DF8F3C494C7E}" type="datetime1">
               <a:rPr lang="en-US" smtClean="0"/>
-              <a:t>1/23/25</a:t>
+              <a:t>1/23/26</a:t>
             </a:fld>
             <a:endParaRPr lang="en-US" dirty="0"/>
           </a:p>
@@ -27386,7 +27407,7 @@
           <a:p>
             <a:fld id="{1775B394-D9F9-4F0C-B15D-605F45CB9E9F}" type="datetime1">
               <a:rPr lang="en-US" smtClean="0"/>
-              <a:t>1/23/25</a:t>
+              <a:t>1/23/26</a:t>
             </a:fld>
             <a:endParaRPr lang="en-US" dirty="0"/>
           </a:p>
@@ -27543,7 +27564,7 @@
           <a:p>
             <a:fld id="{39667345-2558-425A-8533-9BFDBCE15005}" type="datetime1">
               <a:rPr lang="en-US" smtClean="0"/>
-              <a:t>1/23/25</a:t>
+              <a:t>1/23/26</a:t>
             </a:fld>
             <a:endParaRPr lang="en-US" dirty="0"/>
           </a:p>
@@ -27872,7 +27893,7 @@
           <a:p>
             <a:fld id="{92BEA474-078D-4E9B-9B14-09A87B19DC46}" type="datetime1">
               <a:rPr lang="en-US" smtClean="0"/>
-              <a:t>1/23/25</a:t>
+              <a:t>1/23/26</a:t>
             </a:fld>
             <a:endParaRPr lang="en-US" dirty="0"/>
           </a:p>
@@ -28222,7 +28243,7 @@
           <a:p>
             <a:fld id="{4907D986-8816-4272-A432-0437A28A9828}" type="datetime1">
               <a:rPr lang="en-US" smtClean="0"/>
-              <a:t>1/23/25</a:t>
+              <a:t>1/23/26</a:t>
             </a:fld>
             <a:endParaRPr lang="en-US" dirty="0"/>
           </a:p>
@@ -28354,6 +28375,13 @@
             <a:schemeClr val="lt1"/>
           </a:fontRef>
         </p:style>
+        <p:txBody>
+          <a:bodyPr/>
+          <a:lstStyle/>
+          <a:p>
+            <a:endParaRPr lang="en-US"/>
+          </a:p>
+        </p:txBody>
       </p:sp>
       <p:sp>
         <p:nvSpPr>
@@ -28483,7 +28511,7 @@
           <a:p>
             <a:fld id="{62D6E202-B606-4609-B914-27C9371A1F6D}" type="datetime1">
               <a:rPr lang="en-US" smtClean="0"/>
-              <a:t>1/23/25</a:t>
+              <a:t>1/23/26</a:t>
             </a:fld>
             <a:endParaRPr lang="en-US" dirty="0"/>
           </a:p>
@@ -31700,7 +31728,7 @@
             <p:ph idx="1"/>
             <p:extLst>
               <p:ext uri="{D42A27DB-BD31-4B8C-83A1-F6EECF244321}">
-                <p14:modId xmlns:p14="http://schemas.microsoft.com/office/powerpoint/2010/main" val="754614322"/>
+                <p14:modId xmlns:p14="http://schemas.microsoft.com/office/powerpoint/2010/main" val="3154749820"/>
               </p:ext>
             </p:extLst>
           </p:nvPr>

</xml_diff>